<commit_message>
Apostila e Lista Exercicio
</commit_message>
<xml_diff>
--- a/Conceitos_Computacao_Nuvem_Completo.pptx
+++ b/Conceitos_Computacao_Nuvem_Completo.pptx
@@ -3318,7 +3318,9 @@
         </p:nvSpPr>
         <p:spPr/>
         <p:txBody>
-          <a:bodyPr/>
+          <a:bodyPr>
+            <a:normAutofit fontScale="90000"/>
+          </a:bodyPr>
           <a:lstStyle/>
           <a:p>
             <a:r>
@@ -3385,7 +3387,9 @@
         </p:nvSpPr>
         <p:spPr/>
         <p:txBody>
-          <a:bodyPr/>
+          <a:bodyPr>
+            <a:normAutofit fontScale="90000"/>
+          </a:bodyPr>
           <a:lstStyle/>
           <a:p>
             <a:r>
@@ -3715,7 +3719,9 @@
         </p:nvSpPr>
         <p:spPr/>
         <p:txBody>
-          <a:bodyPr/>
+          <a:bodyPr>
+            <a:normAutofit fontScale="90000"/>
+          </a:bodyPr>
           <a:lstStyle/>
           <a:p>
             <a:r>
@@ -3782,7 +3788,9 @@
         </p:nvSpPr>
         <p:spPr/>
         <p:txBody>
-          <a:bodyPr/>
+          <a:bodyPr>
+            <a:normAutofit fontScale="90000"/>
+          </a:bodyPr>
           <a:lstStyle/>
           <a:p>
             <a:r>
@@ -3869,7 +3877,9 @@
         </p:nvSpPr>
         <p:spPr/>
         <p:txBody>
-          <a:bodyPr/>
+          <a:bodyPr>
+            <a:normAutofit fontScale="90000"/>
+          </a:bodyPr>
           <a:lstStyle/>
           <a:p>
             <a:r>

</xml_diff>